<commit_message>
Got images for shapeContexts for poster.
</commit_message>
<xml_diff>
--- a/posterAndSlide/poster.pptx
+++ b/posterAndSlide/poster.pptx
@@ -8,7 +8,7 @@
     <p:sldId id="256" r:id="rId3"/>
   </p:sldIdLst>
   <p:sldSz cx="36576000" cy="27432000"/>
-  <p:notesSz cx="32004000" cy="51101625"/>
+  <p:notesSz cx="7772400" cy="10058400"/>
 </p:presentation>
 </file>
 
@@ -1199,7 +1199,7 @@
         <p:spPr>
           <a:xfrm>
             <a:off x="2743200" y="24991920"/>
-            <a:ext cx="7618320" cy="1827000"/>
+            <a:ext cx="7617960" cy="1826640"/>
           </a:xfrm>
           <a:prstGeom prst="rect">
             <a:avLst/>
@@ -1225,7 +1225,7 @@
         <p:spPr>
           <a:xfrm>
             <a:off x="12496680" y="24991920"/>
-            <a:ext cx="11580480" cy="1827000"/>
+            <a:ext cx="11580120" cy="1826640"/>
           </a:xfrm>
           <a:prstGeom prst="rect">
             <a:avLst/>
@@ -1442,7 +1442,7 @@
         <p:spPr>
           <a:xfrm>
             <a:off x="6193440" y="608040"/>
-            <a:ext cx="24229800" cy="1522080"/>
+            <a:ext cx="24229440" cy="1521720"/>
           </a:xfrm>
           <a:prstGeom prst="rect">
             <a:avLst/>
@@ -1489,7 +1489,7 @@
         <p:spPr>
           <a:xfrm>
             <a:off x="1607400" y="1637640"/>
-            <a:ext cx="32916600" cy="1011240"/>
+            <a:ext cx="32916240" cy="1010880"/>
           </a:xfrm>
           <a:prstGeom prst="rect">
             <a:avLst/>
@@ -1539,8 +1539,8 @@
         </p:blipFill>
         <p:spPr>
           <a:xfrm>
-            <a:off x="29527200" y="19568160"/>
-            <a:ext cx="2019600" cy="3334680"/>
+            <a:off x="5852160" y="21671280"/>
+            <a:ext cx="2019240" cy="3334320"/>
           </a:xfrm>
           <a:prstGeom prst="rect">
             <a:avLst/>
@@ -1562,8 +1562,8 @@
         </p:blipFill>
         <p:spPr>
           <a:xfrm>
-            <a:off x="15577560" y="18734400"/>
-            <a:ext cx="1981440" cy="3305880"/>
+            <a:off x="28562400" y="19211040"/>
+            <a:ext cx="1981080" cy="3305520"/>
           </a:xfrm>
           <a:prstGeom prst="rect">
             <a:avLst/>
@@ -1575,14 +1575,14 @@
       </p:pic>
       <p:sp>
         <p:nvSpPr>
-          <p:cNvPr id="42" name="TextShape 3"/>
-          <p:cNvSpPr txBox="1"/>
-          <p:nvPr/>
-        </p:nvSpPr>
-        <p:spPr>
-          <a:xfrm>
-            <a:off x="12712320" y="22402800"/>
-            <a:ext cx="2402640" cy="1896120"/>
+          <p:cNvPr id="42" name="CustomShape 3"/>
+          <p:cNvSpPr/>
+          <p:nvPr/>
+        </p:nvSpPr>
+        <p:spPr>
+          <a:xfrm>
+            <a:off x="25697160" y="22879440"/>
+            <a:ext cx="2402280" cy="1895760"/>
           </a:xfrm>
           <a:prstGeom prst="rect">
             <a:avLst/>
@@ -1592,11 +1592,17 @@
             <a:noFill/>
           </a:ln>
         </p:spPr>
+        <p:style>
+          <a:lnRef idx="0"/>
+          <a:fillRef idx="0"/>
+          <a:effectRef idx="0"/>
+          <a:fontRef idx="minor"/>
+        </p:style>
         <p:txBody>
           <a:bodyPr lIns="90000" rIns="90000" tIns="45000" bIns="45000"/>
           <a:p>
             <a:r>
-              <a:rPr lang="en-US" sz="3200">
+              <a:rPr lang="en-US" sz="3200" strike="noStrike">
                 <a:latin typeface="Times New Roman"/>
               </a:rPr>
               <a:t>p(xi) given</a:t>
@@ -1605,7 +1611,7 @@
           </a:p>
           <a:p>
             <a:r>
-              <a:rPr lang="en-US" sz="3200">
+              <a:rPr lang="en-US" sz="3200" strike="noStrike">
                 <a:latin typeface="Times New Roman"/>
               </a:rPr>
               <a:t>one keypoint,</a:t>
@@ -1614,7 +1620,7 @@
           </a:p>
           <a:p>
             <a:r>
-              <a:rPr lang="en-US" sz="3200">
+              <a:rPr lang="en-US" sz="3200" strike="noStrike">
                 <a:latin typeface="Times New Roman"/>
               </a:rPr>
               <a:t>a</a:t>
@@ -1628,14 +1634,14 @@
       </p:sp>
       <p:sp>
         <p:nvSpPr>
-          <p:cNvPr id="43" name="TextShape 4"/>
-          <p:cNvSpPr txBox="1"/>
-          <p:nvPr/>
-        </p:nvSpPr>
-        <p:spPr>
-          <a:xfrm>
-            <a:off x="15453360" y="22585680"/>
-            <a:ext cx="2378160" cy="1444680"/>
+          <p:cNvPr id="43" name="CustomShape 4"/>
+          <p:cNvSpPr/>
+          <p:nvPr/>
+        </p:nvSpPr>
+        <p:spPr>
+          <a:xfrm>
+            <a:off x="28438200" y="23062320"/>
+            <a:ext cx="2377800" cy="1444320"/>
           </a:xfrm>
           <a:prstGeom prst="rect">
             <a:avLst/>
@@ -1645,11 +1651,17 @@
             <a:noFill/>
           </a:ln>
         </p:spPr>
+        <p:style>
+          <a:lnRef idx="0"/>
+          <a:fillRef idx="0"/>
+          <a:effectRef idx="0"/>
+          <a:fontRef idx="minor"/>
+        </p:style>
         <p:txBody>
           <a:bodyPr lIns="90000" rIns="90000" tIns="45000" bIns="45000"/>
           <a:p>
             <a:r>
-              <a:rPr lang="en-US" sz="3200">
+              <a:rPr lang="en-US" sz="3200" strike="noStrike">
                 <a:latin typeface="Times New Roman"/>
               </a:rPr>
               <a:t>p(xi) given</a:t>
@@ -1658,7 +1670,7 @@
           </a:p>
           <a:p>
             <a:r>
-              <a:rPr lang="en-US" sz="3200">
+              <a:rPr lang="en-US" sz="3200" strike="noStrike">
                 <a:latin typeface="Times New Roman"/>
               </a:rPr>
               <a:t>all keypoints,</a:t>
@@ -1667,7 +1679,7 @@
           </a:p>
           <a:p>
             <a:r>
-              <a:rPr lang="en-US" sz="3200">
+              <a:rPr lang="en-US" sz="3200" strike="noStrike">
                 <a:latin typeface="Times New Roman"/>
               </a:rPr>
               <a:t>a</a:t>
@@ -1678,14 +1690,14 @@
       </p:sp>
       <p:sp>
         <p:nvSpPr>
-          <p:cNvPr id="44" name="TextShape 5"/>
-          <p:cNvSpPr txBox="1"/>
-          <p:nvPr/>
-        </p:nvSpPr>
-        <p:spPr>
-          <a:xfrm>
-            <a:off x="18288000" y="17556480"/>
-            <a:ext cx="1982160" cy="993240"/>
+          <p:cNvPr id="44" name="CustomShape 5"/>
+          <p:cNvSpPr/>
+          <p:nvPr/>
+        </p:nvSpPr>
+        <p:spPr>
+          <a:xfrm>
+            <a:off x="31272840" y="18033120"/>
+            <a:ext cx="1981800" cy="992880"/>
           </a:xfrm>
           <a:prstGeom prst="rect">
             <a:avLst/>
@@ -1695,11 +1707,17 @@
             <a:noFill/>
           </a:ln>
         </p:spPr>
+        <p:style>
+          <a:lnRef idx="0"/>
+          <a:fillRef idx="0"/>
+          <a:effectRef idx="0"/>
+          <a:fontRef idx="minor"/>
+        </p:style>
         <p:txBody>
           <a:bodyPr lIns="90000" rIns="90000" tIns="45000" bIns="45000"/>
           <a:p>
             <a:r>
-              <a:rPr lang="en-US" sz="3200">
+              <a:rPr lang="en-US" sz="3200" strike="noStrike">
                 <a:latin typeface="Times New Roman"/>
               </a:rPr>
               <a:t>p(xi) given</a:t>
@@ -1708,7 +1726,7 @@
           </a:p>
           <a:p>
             <a:r>
-              <a:rPr lang="en-US" sz="3200">
+              <a:rPr lang="en-US" sz="3200" strike="noStrike">
                 <a:latin typeface="Times New Roman"/>
               </a:rPr>
               <a:t>x0, a</a:t>
@@ -1719,14 +1737,14 @@
       </p:sp>
       <p:sp>
         <p:nvSpPr>
-          <p:cNvPr id="45" name="TextShape 6"/>
-          <p:cNvSpPr txBox="1"/>
-          <p:nvPr/>
-        </p:nvSpPr>
-        <p:spPr>
-          <a:xfrm>
-            <a:off x="18288000" y="22421160"/>
-            <a:ext cx="1982160" cy="1444680"/>
+          <p:cNvPr id="45" name="CustomShape 6"/>
+          <p:cNvSpPr/>
+          <p:nvPr/>
+        </p:nvSpPr>
+        <p:spPr>
+          <a:xfrm>
+            <a:off x="31272840" y="22897800"/>
+            <a:ext cx="1981800" cy="1444320"/>
           </a:xfrm>
           <a:prstGeom prst="rect">
             <a:avLst/>
@@ -1736,11 +1754,17 @@
             <a:noFill/>
           </a:ln>
         </p:spPr>
+        <p:style>
+          <a:lnRef idx="0"/>
+          <a:fillRef idx="0"/>
+          <a:effectRef idx="0"/>
+          <a:fontRef idx="minor"/>
+        </p:style>
         <p:txBody>
           <a:bodyPr lIns="90000" rIns="90000" tIns="45000" bIns="45000"/>
           <a:p>
             <a:r>
-              <a:rPr lang="en-US" sz="3200">
+              <a:rPr lang="en-US" sz="3200" strike="noStrike">
                 <a:latin typeface="Times New Roman"/>
               </a:rPr>
               <a:t>p(xi) given</a:t>
@@ -1749,7 +1773,7 @@
           </a:p>
           <a:p>
             <a:r>
-              <a:rPr lang="en-US" sz="3200">
+              <a:rPr lang="en-US" sz="3200" strike="noStrike">
                 <a:latin typeface="Times New Roman"/>
               </a:rPr>
               <a:t>x0, a, and</a:t>
@@ -1758,7 +1782,7 @@
           </a:p>
           <a:p>
             <a:r>
-              <a:rPr lang="en-US" sz="3200">
+              <a:rPr lang="en-US" sz="3200" strike="noStrike">
                 <a:latin typeface="Times New Roman"/>
               </a:rPr>
               <a:t>keypoints</a:t>
@@ -1775,8 +1799,8 @@
         </p:nvSpPr>
         <p:spPr>
           <a:xfrm>
-            <a:off x="12020400" y="12070080"/>
-            <a:ext cx="8827920" cy="12070080"/>
+            <a:off x="25005240" y="12546720"/>
+            <a:ext cx="8827560" cy="12069720"/>
           </a:xfrm>
           <a:prstGeom prst="rect">
             <a:avLst/>
@@ -1808,8 +1832,8 @@
         </p:blipFill>
         <p:spPr>
           <a:xfrm>
-            <a:off x="12339000" y="18470880"/>
-            <a:ext cx="1981080" cy="3286080"/>
+            <a:off x="25323840" y="18947520"/>
+            <a:ext cx="1980720" cy="3285720"/>
           </a:xfrm>
           <a:prstGeom prst="rect">
             <a:avLst/>
@@ -1831,8 +1855,321 @@
         </p:blipFill>
         <p:spPr>
           <a:xfrm>
-            <a:off x="12618720" y="18750960"/>
-            <a:ext cx="1981080" cy="3286080"/>
+            <a:off x="25603560" y="19227600"/>
+            <a:ext cx="1980720" cy="3285720"/>
+          </a:xfrm>
+          <a:prstGeom prst="rect">
+            <a:avLst/>
+          </a:prstGeom>
+          <a:ln>
+            <a:noFill/>
+          </a:ln>
+        </p:spPr>
+      </p:pic>
+      <p:sp>
+        <p:nvSpPr>
+          <p:cNvPr id="49" name="CustomShape 8"/>
+          <p:cNvSpPr/>
+          <p:nvPr/>
+        </p:nvSpPr>
+        <p:spPr>
+          <a:xfrm>
+            <a:off x="31821480" y="12546720"/>
+            <a:ext cx="1645920" cy="822960"/>
+          </a:xfrm>
+          <a:prstGeom prst="rect">
+            <a:avLst/>
+          </a:prstGeom>
+          <a:noFill/>
+          <a:ln>
+            <a:noFill/>
+          </a:ln>
+        </p:spPr>
+        <p:style>
+          <a:lnRef idx="0"/>
+          <a:fillRef idx="0"/>
+          <a:effectRef idx="0"/>
+          <a:fontRef idx="minor"/>
+        </p:style>
+        <p:txBody>
+          <a:bodyPr lIns="90000" rIns="90000" tIns="45000" bIns="45000"/>
+          <a:p>
+            <a:r>
+              <a:rPr lang="en-US" sz="3200" strike="noStrike">
+                <a:latin typeface="Times New Roman"/>
+              </a:rPr>
+              <a:t>Vary xi</a:t>
+            </a:r>
+            <a:endParaRPr/>
+          </a:p>
+        </p:txBody>
+      </p:sp>
+      <p:sp>
+        <p:nvSpPr>
+          <p:cNvPr id="50" name="CustomShape 9"/>
+          <p:cNvSpPr/>
+          <p:nvPr/>
+        </p:nvSpPr>
+        <p:spPr>
+          <a:xfrm>
+            <a:off x="30998520" y="13186800"/>
+            <a:ext cx="2834280" cy="11429640"/>
+          </a:xfrm>
+          <a:prstGeom prst="rect">
+            <a:avLst/>
+          </a:prstGeom>
+          <a:noFill/>
+          <a:ln w="12600">
+            <a:solidFill>
+              <a:srgbClr val="000000"/>
+            </a:solidFill>
+            <a:miter/>
+          </a:ln>
+        </p:spPr>
+        <p:style>
+          <a:lnRef idx="0"/>
+          <a:fillRef idx="0"/>
+          <a:effectRef idx="0"/>
+          <a:fontRef idx="minor"/>
+        </p:style>
+      </p:sp>
+      <p:sp>
+        <p:nvSpPr>
+          <p:cNvPr id="51" name="CustomShape 10"/>
+          <p:cNvSpPr/>
+          <p:nvPr/>
+        </p:nvSpPr>
+        <p:spPr>
+          <a:xfrm>
+            <a:off x="25786440" y="11704320"/>
+            <a:ext cx="7040880" cy="822960"/>
+          </a:xfrm>
+          <a:prstGeom prst="rect">
+            <a:avLst/>
+          </a:prstGeom>
+          <a:noFill/>
+          <a:ln>
+            <a:noFill/>
+          </a:ln>
+        </p:spPr>
+        <p:style>
+          <a:lnRef idx="0"/>
+          <a:fillRef idx="0"/>
+          <a:effectRef idx="0"/>
+          <a:fontRef idx="minor"/>
+        </p:style>
+        <p:txBody>
+          <a:bodyPr lIns="90000" rIns="90000" tIns="45000" bIns="45000"/>
+          <a:p>
+            <a:pPr algn="ctr"/>
+            <a:r>
+              <a:rPr lang="en-US" sz="3200" strike="noStrike">
+                <a:latin typeface="Times New Roman"/>
+              </a:rPr>
+              <a:t>Vary articulation state a</a:t>
+            </a:r>
+            <a:endParaRPr/>
+          </a:p>
+        </p:txBody>
+      </p:sp>
+      <p:pic>
+        <p:nvPicPr>
+          <p:cNvPr id="52" name="" descr=""/>
+          <p:cNvPicPr/>
+          <p:nvPr/>
+        </p:nvPicPr>
+        <p:blipFill>
+          <a:blip r:embed="rId5"/>
+          <a:stretch/>
+        </p:blipFill>
+        <p:spPr>
+          <a:xfrm>
+            <a:off x="5624640" y="4494240"/>
+            <a:ext cx="4133880" cy="1723680"/>
+          </a:xfrm>
+          <a:prstGeom prst="rect">
+            <a:avLst/>
+          </a:prstGeom>
+          <a:ln>
+            <a:noFill/>
+          </a:ln>
+        </p:spPr>
+      </p:pic>
+      <p:pic>
+        <p:nvPicPr>
+          <p:cNvPr id="53" name="" descr=""/>
+          <p:cNvPicPr/>
+          <p:nvPr/>
+        </p:nvPicPr>
+        <p:blipFill>
+          <a:blip r:embed="rId6"/>
+          <a:stretch/>
+        </p:blipFill>
+        <p:spPr>
+          <a:xfrm>
+            <a:off x="5592960" y="6515280"/>
+            <a:ext cx="4191120" cy="1714320"/>
+          </a:xfrm>
+          <a:prstGeom prst="rect">
+            <a:avLst/>
+          </a:prstGeom>
+          <a:ln>
+            <a:noFill/>
+          </a:ln>
+        </p:spPr>
+      </p:pic>
+      <p:pic>
+        <p:nvPicPr>
+          <p:cNvPr id="54" name="" descr=""/>
+          <p:cNvPicPr/>
+          <p:nvPr/>
+        </p:nvPicPr>
+        <p:blipFill>
+          <a:blip r:embed="rId7"/>
+          <a:stretch/>
+        </p:blipFill>
+        <p:spPr>
+          <a:xfrm>
+            <a:off x="5760720" y="9326880"/>
+            <a:ext cx="4114800" cy="1733400"/>
+          </a:xfrm>
+          <a:prstGeom prst="rect">
+            <a:avLst/>
+          </a:prstGeom>
+          <a:ln>
+            <a:noFill/>
+          </a:ln>
+        </p:spPr>
+      </p:pic>
+      <p:pic>
+        <p:nvPicPr>
+          <p:cNvPr id="55" name="" descr=""/>
+          <p:cNvPicPr/>
+          <p:nvPr/>
+        </p:nvPicPr>
+        <p:blipFill>
+          <a:blip r:embed="rId8"/>
+          <a:stretch/>
+        </p:blipFill>
+        <p:spPr>
+          <a:xfrm>
+            <a:off x="5833080" y="12344400"/>
+            <a:ext cx="4133880" cy="1723680"/>
+          </a:xfrm>
+          <a:prstGeom prst="rect">
+            <a:avLst/>
+          </a:prstGeom>
+          <a:ln>
+            <a:noFill/>
+          </a:ln>
+        </p:spPr>
+      </p:pic>
+      <p:pic>
+        <p:nvPicPr>
+          <p:cNvPr id="56" name="" descr=""/>
+          <p:cNvPicPr/>
+          <p:nvPr/>
+        </p:nvPicPr>
+        <p:blipFill>
+          <a:blip r:embed="rId9"/>
+          <a:stretch/>
+        </p:blipFill>
+        <p:spPr>
+          <a:xfrm>
+            <a:off x="1463040" y="5246280"/>
+            <a:ext cx="3257640" cy="3257640"/>
+          </a:xfrm>
+          <a:prstGeom prst="rect">
+            <a:avLst/>
+          </a:prstGeom>
+          <a:ln>
+            <a:noFill/>
+          </a:ln>
+        </p:spPr>
+      </p:pic>
+      <p:pic>
+        <p:nvPicPr>
+          <p:cNvPr id="57" name="" descr=""/>
+          <p:cNvPicPr/>
+          <p:nvPr/>
+        </p:nvPicPr>
+        <p:blipFill>
+          <a:blip r:embed="rId10"/>
+          <a:stretch/>
+        </p:blipFill>
+        <p:spPr>
+          <a:xfrm>
+            <a:off x="1680120" y="11829960"/>
+            <a:ext cx="3257640" cy="3257640"/>
+          </a:xfrm>
+          <a:prstGeom prst="rect">
+            <a:avLst/>
+          </a:prstGeom>
+          <a:ln>
+            <a:noFill/>
+          </a:ln>
+        </p:spPr>
+      </p:pic>
+      <p:pic>
+        <p:nvPicPr>
+          <p:cNvPr id="58" name="" descr=""/>
+          <p:cNvPicPr/>
+          <p:nvPr/>
+        </p:nvPicPr>
+        <p:blipFill>
+          <a:blip r:embed="rId11"/>
+          <a:stretch/>
+        </p:blipFill>
+        <p:spPr>
+          <a:xfrm>
+            <a:off x="10416960" y="6126480"/>
+            <a:ext cx="647280" cy="742680"/>
+          </a:xfrm>
+          <a:prstGeom prst="rect">
+            <a:avLst/>
+          </a:prstGeom>
+          <a:ln>
+            <a:noFill/>
+          </a:ln>
+        </p:spPr>
+      </p:pic>
+      <p:pic>
+        <p:nvPicPr>
+          <p:cNvPr id="59" name="" descr=""/>
+          <p:cNvPicPr/>
+          <p:nvPr/>
+        </p:nvPicPr>
+        <p:blipFill>
+          <a:blip r:embed="rId12"/>
+          <a:stretch/>
+        </p:blipFill>
+        <p:spPr>
+          <a:xfrm>
+            <a:off x="10378800" y="9826200"/>
+            <a:ext cx="685440" cy="780840"/>
+          </a:xfrm>
+          <a:prstGeom prst="rect">
+            <a:avLst/>
+          </a:prstGeom>
+          <a:ln>
+            <a:noFill/>
+          </a:ln>
+        </p:spPr>
+      </p:pic>
+      <p:pic>
+        <p:nvPicPr>
+          <p:cNvPr id="60" name="" descr=""/>
+          <p:cNvPicPr/>
+          <p:nvPr/>
+        </p:nvPicPr>
+        <p:blipFill>
+          <a:blip r:embed="rId13"/>
+          <a:stretch/>
+        </p:blipFill>
+        <p:spPr>
+          <a:xfrm>
+            <a:off x="10559880" y="12984480"/>
+            <a:ext cx="504360" cy="514080"/>
           </a:xfrm>
           <a:prstGeom prst="rect">
             <a:avLst/>

</xml_diff>